<commit_message>
alles klaar voor presentatie
</commit_message>
<xml_diff>
--- a/poster presentatie.pptx
+++ b/poster presentatie.pptx
@@ -104,6 +104,11 @@
       </a:defRPr>
     </a:lvl9pPr>
   </p:defaultTextStyle>
+  <p:extLst>
+    <p:ext uri="{EFAFB233-063F-42B5-8137-9DF3F51BA10A}">
+      <p15:sldGuideLst xmlns:p15="http://schemas.microsoft.com/office/powerpoint/2012/main"/>
+    </p:ext>
+  </p:extLst>
 </p:presentation>
 </file>
 
@@ -238,7 +243,7 @@
           <a:p>
             <a:fld id="{A929E5FD-F2F9-4D35-B642-6A6BDDB0681D}" type="datetimeFigureOut">
               <a:rPr lang="nl-NL" smtClean="0"/>
-              <a:t>13-9-2022</a:t>
+              <a:t>14-9-2022</a:t>
             </a:fld>
             <a:endParaRPr lang="nl-NL"/>
           </a:p>
@@ -408,7 +413,7 @@
           <a:p>
             <a:fld id="{A929E5FD-F2F9-4D35-B642-6A6BDDB0681D}" type="datetimeFigureOut">
               <a:rPr lang="nl-NL" smtClean="0"/>
-              <a:t>13-9-2022</a:t>
+              <a:t>14-9-2022</a:t>
             </a:fld>
             <a:endParaRPr lang="nl-NL"/>
           </a:p>
@@ -588,7 +593,7 @@
           <a:p>
             <a:fld id="{A929E5FD-F2F9-4D35-B642-6A6BDDB0681D}" type="datetimeFigureOut">
               <a:rPr lang="nl-NL" smtClean="0"/>
-              <a:t>13-9-2022</a:t>
+              <a:t>14-9-2022</a:t>
             </a:fld>
             <a:endParaRPr lang="nl-NL"/>
           </a:p>
@@ -758,7 +763,7 @@
           <a:p>
             <a:fld id="{A929E5FD-F2F9-4D35-B642-6A6BDDB0681D}" type="datetimeFigureOut">
               <a:rPr lang="nl-NL" smtClean="0"/>
-              <a:t>13-9-2022</a:t>
+              <a:t>14-9-2022</a:t>
             </a:fld>
             <a:endParaRPr lang="nl-NL"/>
           </a:p>
@@ -1002,7 +1007,7 @@
           <a:p>
             <a:fld id="{A929E5FD-F2F9-4D35-B642-6A6BDDB0681D}" type="datetimeFigureOut">
               <a:rPr lang="nl-NL" smtClean="0"/>
-              <a:t>13-9-2022</a:t>
+              <a:t>14-9-2022</a:t>
             </a:fld>
             <a:endParaRPr lang="nl-NL"/>
           </a:p>
@@ -1234,7 +1239,7 @@
           <a:p>
             <a:fld id="{A929E5FD-F2F9-4D35-B642-6A6BDDB0681D}" type="datetimeFigureOut">
               <a:rPr lang="nl-NL" smtClean="0"/>
-              <a:t>13-9-2022</a:t>
+              <a:t>14-9-2022</a:t>
             </a:fld>
             <a:endParaRPr lang="nl-NL"/>
           </a:p>
@@ -1601,7 +1606,7 @@
           <a:p>
             <a:fld id="{A929E5FD-F2F9-4D35-B642-6A6BDDB0681D}" type="datetimeFigureOut">
               <a:rPr lang="nl-NL" smtClean="0"/>
-              <a:t>13-9-2022</a:t>
+              <a:t>14-9-2022</a:t>
             </a:fld>
             <a:endParaRPr lang="nl-NL"/>
           </a:p>
@@ -1719,7 +1724,7 @@
           <a:p>
             <a:fld id="{A929E5FD-F2F9-4D35-B642-6A6BDDB0681D}" type="datetimeFigureOut">
               <a:rPr lang="nl-NL" smtClean="0"/>
-              <a:t>13-9-2022</a:t>
+              <a:t>14-9-2022</a:t>
             </a:fld>
             <a:endParaRPr lang="nl-NL"/>
           </a:p>
@@ -1814,7 +1819,7 @@
           <a:p>
             <a:fld id="{A929E5FD-F2F9-4D35-B642-6A6BDDB0681D}" type="datetimeFigureOut">
               <a:rPr lang="nl-NL" smtClean="0"/>
-              <a:t>13-9-2022</a:t>
+              <a:t>14-9-2022</a:t>
             </a:fld>
             <a:endParaRPr lang="nl-NL"/>
           </a:p>
@@ -2091,7 +2096,7 @@
           <a:p>
             <a:fld id="{A929E5FD-F2F9-4D35-B642-6A6BDDB0681D}" type="datetimeFigureOut">
               <a:rPr lang="nl-NL" smtClean="0"/>
-              <a:t>13-9-2022</a:t>
+              <a:t>14-9-2022</a:t>
             </a:fld>
             <a:endParaRPr lang="nl-NL"/>
           </a:p>
@@ -2348,7 +2353,7 @@
           <a:p>
             <a:fld id="{A929E5FD-F2F9-4D35-B642-6A6BDDB0681D}" type="datetimeFigureOut">
               <a:rPr lang="nl-NL" smtClean="0"/>
-              <a:t>13-9-2022</a:t>
+              <a:t>14-9-2022</a:t>
             </a:fld>
             <a:endParaRPr lang="nl-NL"/>
           </a:p>
@@ -2561,7 +2566,7 @@
           <a:p>
             <a:fld id="{A929E5FD-F2F9-4D35-B642-6A6BDDB0681D}" type="datetimeFigureOut">
               <a:rPr lang="nl-NL" smtClean="0"/>
-              <a:t>13-9-2022</a:t>
+              <a:t>14-9-2022</a:t>
             </a:fld>
             <a:endParaRPr lang="nl-NL"/>
           </a:p>
@@ -3065,7 +3070,7 @@
         </p:nvSpPr>
         <p:spPr>
           <a:xfrm>
-            <a:off x="2166256" y="978180"/>
+            <a:off x="2753683" y="650490"/>
             <a:ext cx="1988457" cy="307777"/>
           </a:xfrm>
           <a:prstGeom prst="rect">
@@ -3093,15 +3098,15 @@
       </p:sp>
       <p:pic>
         <p:nvPicPr>
-          <p:cNvPr id="1026" name="Picture 2">
+          <p:cNvPr id="20" name="Afbeelding 19" descr="Afbeelding met tekst, binnen, krant&#10;&#10;Automatisch gegenereerde beschrijving">
             <a:extLst>
               <a:ext uri="{FF2B5EF4-FFF2-40B4-BE49-F238E27FC236}">
-                <a16:creationId xmlns:a16="http://schemas.microsoft.com/office/drawing/2014/main" id="{5A791C6A-4FE6-1415-CCD2-F496E8410FFE}"/>
+                <a16:creationId xmlns:a16="http://schemas.microsoft.com/office/drawing/2014/main" id="{B4BFF060-7886-11EF-28B6-D35F77A91F00}"/>
               </a:ext>
             </a:extLst>
           </p:cNvPr>
           <p:cNvPicPr>
-            <a:picLocks noChangeAspect="1" noChangeArrowheads="1"/>
+            <a:picLocks noChangeAspect="1"/>
           </p:cNvPicPr>
           <p:nvPr/>
         </p:nvPicPr>
@@ -3113,42 +3118,31 @@
               </a:ext>
             </a:extLst>
           </a:blip>
-          <a:srcRect/>
           <a:stretch>
             <a:fillRect/>
           </a:stretch>
         </p:blipFill>
-        <p:spPr bwMode="auto">
+        <p:spPr>
           <a:xfrm>
-            <a:off x="1520371" y="661277"/>
-            <a:ext cx="3280229" cy="470792"/>
+            <a:off x="64074" y="9620788"/>
+            <a:ext cx="3482642" cy="2903472"/>
           </a:xfrm>
           <a:prstGeom prst="rect">
             <a:avLst/>
           </a:prstGeom>
-          <a:noFill/>
-          <a:extLst>
-            <a:ext uri="{909E8E84-426E-40DD-AFC4-6F175D3DCCD1}">
-              <a14:hiddenFill xmlns:a14="http://schemas.microsoft.com/office/drawing/2010/main">
-                <a:solidFill>
-                  <a:srgbClr val="FFFFFF"/>
-                </a:solidFill>
-              </a14:hiddenFill>
-            </a:ext>
-          </a:extLst>
         </p:spPr>
       </p:pic>
       <p:pic>
         <p:nvPicPr>
-          <p:cNvPr id="1028" name="Picture 4" descr="freetoedit heart hearts purple 311089994090211 by @lizcc1">
+          <p:cNvPr id="22" name="Afbeelding 21">
             <a:extLst>
               <a:ext uri="{FF2B5EF4-FFF2-40B4-BE49-F238E27FC236}">
-                <a16:creationId xmlns:a16="http://schemas.microsoft.com/office/drawing/2014/main" id="{8F022A3B-B2AF-A183-A0C2-AB1173DF72E5}"/>
+                <a16:creationId xmlns:a16="http://schemas.microsoft.com/office/drawing/2014/main" id="{3F0ADBC6-A531-A739-2DE6-313816CB9774}"/>
               </a:ext>
             </a:extLst>
           </p:cNvPr>
           <p:cNvPicPr>
-            <a:picLocks noChangeAspect="1" noChangeArrowheads="1"/>
+            <a:picLocks noChangeAspect="1"/>
           </p:cNvPicPr>
           <p:nvPr/>
         </p:nvPicPr>
@@ -3160,84 +3154,26 @@
               </a:ext>
             </a:extLst>
           </a:blip>
-          <a:srcRect/>
           <a:stretch>
             <a:fillRect/>
           </a:stretch>
         </p:blipFill>
-        <p:spPr bwMode="auto">
+        <p:spPr>
           <a:xfrm>
-            <a:off x="7183767" y="3063999"/>
-            <a:ext cx="2627086" cy="2627086"/>
+            <a:off x="3701156" y="9620788"/>
+            <a:ext cx="4803423" cy="2904646"/>
           </a:xfrm>
           <a:prstGeom prst="rect">
             <a:avLst/>
           </a:prstGeom>
-          <a:noFill/>
-          <a:extLst>
-            <a:ext uri="{909E8E84-426E-40DD-AFC4-6F175D3DCCD1}">
-              <a14:hiddenFill xmlns:a14="http://schemas.microsoft.com/office/drawing/2010/main">
-                <a:solidFill>
-                  <a:srgbClr val="FFFFFF"/>
-                </a:solidFill>
-              </a14:hiddenFill>
-            </a:ext>
-          </a:extLst>
         </p:spPr>
       </p:pic>
       <p:pic>
         <p:nvPicPr>
-          <p:cNvPr id="16" name="Picture 4" descr="freetoedit heart hearts purple 311089994090211 by @lizcc1">
+          <p:cNvPr id="24" name="Afbeelding 23">
             <a:extLst>
               <a:ext uri="{FF2B5EF4-FFF2-40B4-BE49-F238E27FC236}">
-                <a16:creationId xmlns:a16="http://schemas.microsoft.com/office/drawing/2014/main" id="{93AE7612-D674-90A0-6508-753749D4A059}"/>
-              </a:ext>
-            </a:extLst>
-          </p:cNvPr>
-          <p:cNvPicPr>
-            <a:picLocks noChangeAspect="1" noChangeArrowheads="1"/>
-          </p:cNvPicPr>
-          <p:nvPr/>
-        </p:nvPicPr>
-        <p:blipFill>
-          <a:blip r:embed="rId3">
-            <a:extLst>
-              <a:ext uri="{28A0092B-C50C-407E-A947-70E740481C1C}">
-                <a14:useLocalDpi xmlns:a14="http://schemas.microsoft.com/office/drawing/2010/main" val="0"/>
-              </a:ext>
-            </a:extLst>
-          </a:blip>
-          <a:srcRect/>
-          <a:stretch>
-            <a:fillRect/>
-          </a:stretch>
-        </p:blipFill>
-        <p:spPr bwMode="auto">
-          <a:xfrm>
-            <a:off x="-243275" y="7309181"/>
-            <a:ext cx="2627086" cy="2627086"/>
-          </a:xfrm>
-          <a:prstGeom prst="rect">
-            <a:avLst/>
-          </a:prstGeom>
-          <a:noFill/>
-          <a:extLst>
-            <a:ext uri="{909E8E84-426E-40DD-AFC4-6F175D3DCCD1}">
-              <a14:hiddenFill xmlns:a14="http://schemas.microsoft.com/office/drawing/2010/main">
-                <a:solidFill>
-                  <a:srgbClr val="FFFFFF"/>
-                </a:solidFill>
-              </a14:hiddenFill>
-            </a:ext>
-          </a:extLst>
-        </p:spPr>
-      </p:pic>
-      <p:pic>
-        <p:nvPicPr>
-          <p:cNvPr id="18" name="Afbeelding 17" descr="Afbeelding met tekst&#10;&#10;Automatisch gegenereerde beschrijving">
-            <a:extLst>
-              <a:ext uri="{FF2B5EF4-FFF2-40B4-BE49-F238E27FC236}">
-                <a16:creationId xmlns:a16="http://schemas.microsoft.com/office/drawing/2014/main" id="{9A225E80-D9E2-8E8B-17DC-32E0CF776D8E}"/>
+                <a16:creationId xmlns:a16="http://schemas.microsoft.com/office/drawing/2014/main" id="{F1F0416C-CDD4-12A9-687B-35DFBEC37516}"/>
               </a:ext>
             </a:extLst>
           </p:cNvPr>
@@ -3260,8 +3196,8 @@
         </p:blipFill>
         <p:spPr>
           <a:xfrm>
-            <a:off x="2210525" y="5496380"/>
-            <a:ext cx="7205866" cy="3533465"/>
+            <a:off x="8100818" y="11992062"/>
+            <a:ext cx="1333616" cy="312447"/>
           </a:xfrm>
           <a:prstGeom prst="rect">
             <a:avLst/>
@@ -3270,10 +3206,10 @@
       </p:pic>
       <p:pic>
         <p:nvPicPr>
-          <p:cNvPr id="20" name="Afbeelding 19" descr="Afbeelding met tekst, binnen, krant&#10;&#10;Automatisch gegenereerde beschrijving">
+          <p:cNvPr id="26" name="Afbeelding 25">
             <a:extLst>
               <a:ext uri="{FF2B5EF4-FFF2-40B4-BE49-F238E27FC236}">
-                <a16:creationId xmlns:a16="http://schemas.microsoft.com/office/drawing/2014/main" id="{B4BFF060-7886-11EF-28B6-D35F77A91F00}"/>
+                <a16:creationId xmlns:a16="http://schemas.microsoft.com/office/drawing/2014/main" id="{0CF7088F-603D-AD3A-AC79-89EE4F0D31E0}"/>
               </a:ext>
             </a:extLst>
           </p:cNvPr>
@@ -3296,8 +3232,8 @@
         </p:blipFill>
         <p:spPr>
           <a:xfrm>
-            <a:off x="789886" y="9390910"/>
-            <a:ext cx="3482642" cy="2903472"/>
+            <a:off x="8093198" y="11329638"/>
+            <a:ext cx="1341236" cy="281964"/>
           </a:xfrm>
           <a:prstGeom prst="rect">
             <a:avLst/>
@@ -3306,10 +3242,10 @@
       </p:pic>
       <p:pic>
         <p:nvPicPr>
-          <p:cNvPr id="22" name="Afbeelding 21">
+          <p:cNvPr id="28" name="Afbeelding 27">
             <a:extLst>
               <a:ext uri="{FF2B5EF4-FFF2-40B4-BE49-F238E27FC236}">
-                <a16:creationId xmlns:a16="http://schemas.microsoft.com/office/drawing/2014/main" id="{3F0ADBC6-A531-A739-2DE6-313816CB9774}"/>
+                <a16:creationId xmlns:a16="http://schemas.microsoft.com/office/drawing/2014/main" id="{CBC70DE3-9451-D157-5EE1-C3785B9B9B28}"/>
               </a:ext>
             </a:extLst>
           </p:cNvPr>
@@ -3332,115 +3268,7 @@
         </p:blipFill>
         <p:spPr>
           <a:xfrm>
-            <a:off x="4586112" y="9403317"/>
-            <a:ext cx="4803423" cy="2904646"/>
-          </a:xfrm>
-          <a:prstGeom prst="rect">
-            <a:avLst/>
-          </a:prstGeom>
-        </p:spPr>
-      </p:pic>
-      <p:pic>
-        <p:nvPicPr>
-          <p:cNvPr id="24" name="Afbeelding 23">
-            <a:extLst>
-              <a:ext uri="{FF2B5EF4-FFF2-40B4-BE49-F238E27FC236}">
-                <a16:creationId xmlns:a16="http://schemas.microsoft.com/office/drawing/2014/main" id="{F1F0416C-CDD4-12A9-687B-35DFBEC37516}"/>
-              </a:ext>
-            </a:extLst>
-          </p:cNvPr>
-          <p:cNvPicPr>
-            <a:picLocks noChangeAspect="1"/>
-          </p:cNvPicPr>
-          <p:nvPr/>
-        </p:nvPicPr>
-        <p:blipFill>
-          <a:blip r:embed="rId7">
-            <a:extLst>
-              <a:ext uri="{28A0092B-C50C-407E-A947-70E740481C1C}">
-                <a14:useLocalDpi xmlns:a14="http://schemas.microsoft.com/office/drawing/2010/main" val="0"/>
-              </a:ext>
-            </a:extLst>
-          </a:blip>
-          <a:stretch>
-            <a:fillRect/>
-          </a:stretch>
-        </p:blipFill>
-        <p:spPr>
-          <a:xfrm>
-            <a:off x="5084239" y="4978820"/>
-            <a:ext cx="1333616" cy="312447"/>
-          </a:xfrm>
-          <a:prstGeom prst="rect">
-            <a:avLst/>
-          </a:prstGeom>
-        </p:spPr>
-      </p:pic>
-      <p:pic>
-        <p:nvPicPr>
-          <p:cNvPr id="26" name="Afbeelding 25">
-            <a:extLst>
-              <a:ext uri="{FF2B5EF4-FFF2-40B4-BE49-F238E27FC236}">
-                <a16:creationId xmlns:a16="http://schemas.microsoft.com/office/drawing/2014/main" id="{0CF7088F-603D-AD3A-AC79-89EE4F0D31E0}"/>
-              </a:ext>
-            </a:extLst>
-          </p:cNvPr>
-          <p:cNvPicPr>
-            <a:picLocks noChangeAspect="1"/>
-          </p:cNvPicPr>
-          <p:nvPr/>
-        </p:nvPicPr>
-        <p:blipFill>
-          <a:blip r:embed="rId8">
-            <a:extLst>
-              <a:ext uri="{28A0092B-C50C-407E-A947-70E740481C1C}">
-                <a14:useLocalDpi xmlns:a14="http://schemas.microsoft.com/office/drawing/2010/main" val="0"/>
-              </a:ext>
-            </a:extLst>
-          </a:blip>
-          <a:stretch>
-            <a:fillRect/>
-          </a:stretch>
-        </p:blipFill>
-        <p:spPr>
-          <a:xfrm>
-            <a:off x="264344" y="7834689"/>
-            <a:ext cx="1341236" cy="281964"/>
-          </a:xfrm>
-          <a:prstGeom prst="rect">
-            <a:avLst/>
-          </a:prstGeom>
-        </p:spPr>
-      </p:pic>
-      <p:pic>
-        <p:nvPicPr>
-          <p:cNvPr id="28" name="Afbeelding 27">
-            <a:extLst>
-              <a:ext uri="{FF2B5EF4-FFF2-40B4-BE49-F238E27FC236}">
-                <a16:creationId xmlns:a16="http://schemas.microsoft.com/office/drawing/2014/main" id="{CBC70DE3-9451-D157-5EE1-C3785B9B9B28}"/>
-              </a:ext>
-            </a:extLst>
-          </p:cNvPr>
-          <p:cNvPicPr>
-            <a:picLocks noChangeAspect="1"/>
-          </p:cNvPicPr>
-          <p:nvPr/>
-        </p:nvPicPr>
-        <p:blipFill>
-          <a:blip r:embed="rId9">
-            <a:extLst>
-              <a:ext uri="{28A0092B-C50C-407E-A947-70E740481C1C}">
-                <a14:useLocalDpi xmlns:a14="http://schemas.microsoft.com/office/drawing/2010/main" val="0"/>
-              </a:ext>
-            </a:extLst>
-          </a:blip>
-          <a:stretch>
-            <a:fillRect/>
-          </a:stretch>
-        </p:blipFill>
-        <p:spPr>
-          <a:xfrm>
-            <a:off x="7930362" y="2474822"/>
+            <a:off x="7948405" y="11676453"/>
             <a:ext cx="1486029" cy="259102"/>
           </a:xfrm>
           <a:prstGeom prst="rect">
@@ -3463,7 +3291,7 @@
           <p:nvPr/>
         </p:nvPicPr>
         <p:blipFill>
-          <a:blip r:embed="rId10">
+          <a:blip r:embed="rId7">
             <a:extLst>
               <a:ext uri="{28A0092B-C50C-407E-A947-70E740481C1C}">
                 <a14:useLocalDpi xmlns:a14="http://schemas.microsoft.com/office/drawing/2010/main" val="0"/>
@@ -3497,10 +3325,10 @@
       </p:pic>
       <p:pic>
         <p:nvPicPr>
-          <p:cNvPr id="30" name="Afbeelding 29">
+          <p:cNvPr id="3" name="Afbeelding 2">
             <a:extLst>
               <a:ext uri="{FF2B5EF4-FFF2-40B4-BE49-F238E27FC236}">
-                <a16:creationId xmlns:a16="http://schemas.microsoft.com/office/drawing/2014/main" id="{6B1FE2EE-F681-128F-033D-CCA806A34C84}"/>
+                <a16:creationId xmlns:a16="http://schemas.microsoft.com/office/drawing/2014/main" id="{52E7FE54-B33F-4197-39A4-090E056E90E0}"/>
               </a:ext>
             </a:extLst>
           </p:cNvPr>
@@ -3510,7 +3338,7 @@
           <p:nvPr/>
         </p:nvPicPr>
         <p:blipFill>
-          <a:blip r:embed="rId11">
+          <a:blip r:embed="rId8">
             <a:extLst>
               <a:ext uri="{28A0092B-C50C-407E-A947-70E740481C1C}">
                 <a14:useLocalDpi xmlns:a14="http://schemas.microsoft.com/office/drawing/2010/main" val="0"/>
@@ -3523,12 +3351,142 @@
         </p:blipFill>
         <p:spPr>
           <a:xfrm>
-            <a:off x="220439" y="1355640"/>
-            <a:ext cx="7221542" cy="3533465"/>
+            <a:off x="64074" y="909744"/>
+            <a:ext cx="8644497" cy="4234315"/>
           </a:xfrm>
           <a:prstGeom prst="rect">
             <a:avLst/>
           </a:prstGeom>
+        </p:spPr>
+      </p:pic>
+      <p:pic>
+        <p:nvPicPr>
+          <p:cNvPr id="1028" name="Picture 4" descr="freetoedit heart hearts purple 311089994090211 by @lizcc1">
+            <a:extLst>
+              <a:ext uri="{FF2B5EF4-FFF2-40B4-BE49-F238E27FC236}">
+                <a16:creationId xmlns:a16="http://schemas.microsoft.com/office/drawing/2014/main" id="{8F022A3B-B2AF-A183-A0C2-AB1173DF72E5}"/>
+              </a:ext>
+            </a:extLst>
+          </p:cNvPr>
+          <p:cNvPicPr>
+            <a:picLocks noChangeAspect="1" noChangeArrowheads="1"/>
+          </p:cNvPicPr>
+          <p:nvPr/>
+        </p:nvPicPr>
+        <p:blipFill>
+          <a:blip r:embed="rId9">
+            <a:extLst>
+              <a:ext uri="{28A0092B-C50C-407E-A947-70E740481C1C}">
+                <a14:useLocalDpi xmlns:a14="http://schemas.microsoft.com/office/drawing/2010/main" val="0"/>
+              </a:ext>
+            </a:extLst>
+          </a:blip>
+          <a:srcRect/>
+          <a:stretch>
+            <a:fillRect/>
+          </a:stretch>
+        </p:blipFill>
+        <p:spPr bwMode="auto">
+          <a:xfrm>
+            <a:off x="7173294" y="-167779"/>
+            <a:ext cx="2627086" cy="2627086"/>
+          </a:xfrm>
+          <a:prstGeom prst="rect">
+            <a:avLst/>
+          </a:prstGeom>
+          <a:noFill/>
+          <a:extLst>
+            <a:ext uri="{909E8E84-426E-40DD-AFC4-6F175D3DCCD1}">
+              <a14:hiddenFill xmlns:a14="http://schemas.microsoft.com/office/drawing/2010/main">
+                <a:solidFill>
+                  <a:srgbClr val="FFFFFF"/>
+                </a:solidFill>
+              </a14:hiddenFill>
+            </a:ext>
+          </a:extLst>
+        </p:spPr>
+      </p:pic>
+      <p:pic>
+        <p:nvPicPr>
+          <p:cNvPr id="5" name="Afbeelding 4" descr="Afbeelding met tekst&#10;&#10;Automatisch gegenereerde beschrijving">
+            <a:extLst>
+              <a:ext uri="{FF2B5EF4-FFF2-40B4-BE49-F238E27FC236}">
+                <a16:creationId xmlns:a16="http://schemas.microsoft.com/office/drawing/2014/main" id="{64CC5523-BE94-3FAC-2C63-ACBAFD13FC15}"/>
+              </a:ext>
+            </a:extLst>
+          </p:cNvPr>
+          <p:cNvPicPr>
+            <a:picLocks noChangeAspect="1"/>
+          </p:cNvPicPr>
+          <p:nvPr/>
+        </p:nvPicPr>
+        <p:blipFill>
+          <a:blip r:embed="rId10">
+            <a:extLst>
+              <a:ext uri="{28A0092B-C50C-407E-A947-70E740481C1C}">
+                <a14:useLocalDpi xmlns:a14="http://schemas.microsoft.com/office/drawing/2010/main" val="0"/>
+              </a:ext>
+            </a:extLst>
+          </a:blip>
+          <a:stretch>
+            <a:fillRect/>
+          </a:stretch>
+        </p:blipFill>
+        <p:spPr>
+          <a:xfrm>
+            <a:off x="880648" y="5200566"/>
+            <a:ext cx="8653515" cy="4234315"/>
+          </a:xfrm>
+          <a:prstGeom prst="rect">
+            <a:avLst/>
+          </a:prstGeom>
+        </p:spPr>
+      </p:pic>
+      <p:pic>
+        <p:nvPicPr>
+          <p:cNvPr id="16" name="Picture 4" descr="freetoedit heart hearts purple 311089994090211 by @lizcc1">
+            <a:extLst>
+              <a:ext uri="{FF2B5EF4-FFF2-40B4-BE49-F238E27FC236}">
+                <a16:creationId xmlns:a16="http://schemas.microsoft.com/office/drawing/2014/main" id="{93AE7612-D674-90A0-6508-753749D4A059}"/>
+              </a:ext>
+            </a:extLst>
+          </p:cNvPr>
+          <p:cNvPicPr>
+            <a:picLocks noChangeAspect="1" noChangeArrowheads="1"/>
+          </p:cNvPicPr>
+          <p:nvPr/>
+        </p:nvPicPr>
+        <p:blipFill>
+          <a:blip r:embed="rId9">
+            <a:extLst>
+              <a:ext uri="{28A0092B-C50C-407E-A947-70E740481C1C}">
+                <a14:useLocalDpi xmlns:a14="http://schemas.microsoft.com/office/drawing/2010/main" val="0"/>
+              </a:ext>
+            </a:extLst>
+          </a:blip>
+          <a:srcRect/>
+          <a:stretch>
+            <a:fillRect/>
+          </a:stretch>
+        </p:blipFill>
+        <p:spPr bwMode="auto">
+          <a:xfrm>
+            <a:off x="-316693" y="7885318"/>
+            <a:ext cx="2627086" cy="2627086"/>
+          </a:xfrm>
+          <a:prstGeom prst="rect">
+            <a:avLst/>
+          </a:prstGeom>
+          <a:noFill/>
+          <a:extLst>
+            <a:ext uri="{909E8E84-426E-40DD-AFC4-6F175D3DCCD1}">
+              <a14:hiddenFill xmlns:a14="http://schemas.microsoft.com/office/drawing/2010/main">
+                <a:solidFill>
+                  <a:srgbClr val="FFFFFF"/>
+                </a:solidFill>
+              </a14:hiddenFill>
+            </a:ext>
+          </a:extLst>
         </p:spPr>
       </p:pic>
     </p:spTree>

</xml_diff>